<commit_message>
Refatorou artefatos do 16 ao 19 com a atualização do DFD do terceiro cenario
</commit_message>
<xml_diff>
--- a/artefatos/18 - Descrição de processos de Negócios.pptx
+++ b/artefatos/18 - Descrição de processos de Negócios.pptx
@@ -20,8 +20,8 @@
     <p:sldId id="272" r:id="rId14"/>
     <p:sldId id="273" r:id="rId15"/>
     <p:sldId id="275" r:id="rId16"/>
-    <p:sldId id="274" r:id="rId17"/>
-    <p:sldId id="276" r:id="rId18"/>
+    <p:sldId id="276" r:id="rId17"/>
+    <p:sldId id="274" r:id="rId18"/>
   </p:sldIdLst>
   <p:sldSz cx="12192000" cy="6858000"/>
   <p:notesSz cx="6858000" cy="9144000"/>
@@ -275,7 +275,7 @@
           <a:p>
             <a:fld id="{E078609E-2EB3-48C4-95D0-B9BD7D23E94C}" type="datetimeFigureOut">
               <a:rPr lang="pt-BR" smtClean="0"/>
-              <a:t>02/11/2020</a:t>
+              <a:t>04/11/2020</a:t>
             </a:fld>
             <a:endParaRPr lang="pt-BR"/>
           </a:p>
@@ -473,7 +473,7 @@
           <a:p>
             <a:fld id="{E078609E-2EB3-48C4-95D0-B9BD7D23E94C}" type="datetimeFigureOut">
               <a:rPr lang="pt-BR" smtClean="0"/>
-              <a:t>02/11/2020</a:t>
+              <a:t>04/11/2020</a:t>
             </a:fld>
             <a:endParaRPr lang="pt-BR"/>
           </a:p>
@@ -681,7 +681,7 @@
           <a:p>
             <a:fld id="{E078609E-2EB3-48C4-95D0-B9BD7D23E94C}" type="datetimeFigureOut">
               <a:rPr lang="pt-BR" smtClean="0"/>
-              <a:t>02/11/2020</a:t>
+              <a:t>04/11/2020</a:t>
             </a:fld>
             <a:endParaRPr lang="pt-BR"/>
           </a:p>
@@ -879,7 +879,7 @@
           <a:p>
             <a:fld id="{E078609E-2EB3-48C4-95D0-B9BD7D23E94C}" type="datetimeFigureOut">
               <a:rPr lang="pt-BR" smtClean="0"/>
-              <a:t>02/11/2020</a:t>
+              <a:t>04/11/2020</a:t>
             </a:fld>
             <a:endParaRPr lang="pt-BR"/>
           </a:p>
@@ -1154,7 +1154,7 @@
           <a:p>
             <a:fld id="{E078609E-2EB3-48C4-95D0-B9BD7D23E94C}" type="datetimeFigureOut">
               <a:rPr lang="pt-BR" smtClean="0"/>
-              <a:t>02/11/2020</a:t>
+              <a:t>04/11/2020</a:t>
             </a:fld>
             <a:endParaRPr lang="pt-BR"/>
           </a:p>
@@ -1419,7 +1419,7 @@
           <a:p>
             <a:fld id="{E078609E-2EB3-48C4-95D0-B9BD7D23E94C}" type="datetimeFigureOut">
               <a:rPr lang="pt-BR" smtClean="0"/>
-              <a:t>02/11/2020</a:t>
+              <a:t>04/11/2020</a:t>
             </a:fld>
             <a:endParaRPr lang="pt-BR"/>
           </a:p>
@@ -1831,7 +1831,7 @@
           <a:p>
             <a:fld id="{E078609E-2EB3-48C4-95D0-B9BD7D23E94C}" type="datetimeFigureOut">
               <a:rPr lang="pt-BR" smtClean="0"/>
-              <a:t>02/11/2020</a:t>
+              <a:t>04/11/2020</a:t>
             </a:fld>
             <a:endParaRPr lang="pt-BR"/>
           </a:p>
@@ -1972,7 +1972,7 @@
           <a:p>
             <a:fld id="{E078609E-2EB3-48C4-95D0-B9BD7D23E94C}" type="datetimeFigureOut">
               <a:rPr lang="pt-BR" smtClean="0"/>
-              <a:t>02/11/2020</a:t>
+              <a:t>04/11/2020</a:t>
             </a:fld>
             <a:endParaRPr lang="pt-BR"/>
           </a:p>
@@ -2085,7 +2085,7 @@
           <a:p>
             <a:fld id="{E078609E-2EB3-48C4-95D0-B9BD7D23E94C}" type="datetimeFigureOut">
               <a:rPr lang="pt-BR" smtClean="0"/>
-              <a:t>02/11/2020</a:t>
+              <a:t>04/11/2020</a:t>
             </a:fld>
             <a:endParaRPr lang="pt-BR"/>
           </a:p>
@@ -2396,7 +2396,7 @@
           <a:p>
             <a:fld id="{E078609E-2EB3-48C4-95D0-B9BD7D23E94C}" type="datetimeFigureOut">
               <a:rPr lang="pt-BR" smtClean="0"/>
-              <a:t>02/11/2020</a:t>
+              <a:t>04/11/2020</a:t>
             </a:fld>
             <a:endParaRPr lang="pt-BR"/>
           </a:p>
@@ -2684,7 +2684,7 @@
           <a:p>
             <a:fld id="{E078609E-2EB3-48C4-95D0-B9BD7D23E94C}" type="datetimeFigureOut">
               <a:rPr lang="pt-BR" smtClean="0"/>
-              <a:t>02/11/2020</a:t>
+              <a:t>04/11/2020</a:t>
             </a:fld>
             <a:endParaRPr lang="pt-BR"/>
           </a:p>
@@ -2925,7 +2925,7 @@
           <a:p>
             <a:fld id="{E078609E-2EB3-48C4-95D0-B9BD7D23E94C}" type="datetimeFigureOut">
               <a:rPr lang="pt-BR" smtClean="0"/>
-              <a:t>02/11/2020</a:t>
+              <a:t>04/11/2020</a:t>
             </a:fld>
             <a:endParaRPr lang="pt-BR"/>
           </a:p>
@@ -5226,7 +5226,7 @@
                 <a:latin typeface="Calibri" panose="020F0502020204030204" pitchFamily="34" charset="0"/>
                 <a:cs typeface="Calibri" panose="020F0502020204030204" pitchFamily="34" charset="0"/>
               </a:rPr>
-              <a:t>•Recebe a solicitação de cancelamento do pedido.</a:t>
+              <a:t>• Recebe a solicitação de cancelamento do pedido.</a:t>
             </a:r>
           </a:p>
           <a:p>
@@ -5238,19 +5238,7 @@
                 <a:latin typeface="Calibri" panose="020F0502020204030204" pitchFamily="34" charset="0"/>
                 <a:cs typeface="Calibri" panose="020F0502020204030204" pitchFamily="34" charset="0"/>
               </a:rPr>
-              <a:t>Consulta a loja que realizou o pedido .</a:t>
-            </a:r>
-          </a:p>
-          <a:p>
-            <a:r>
-              <a:rPr lang="pt-BR" sz="2400" dirty="0">
-                <a:solidFill>
-                  <a:srgbClr val="000000"/>
-                </a:solidFill>
-                <a:latin typeface="Calibri" panose="020F0502020204030204" pitchFamily="34" charset="0"/>
-                <a:cs typeface="Calibri" panose="020F0502020204030204" pitchFamily="34" charset="0"/>
-              </a:rPr>
-              <a:t>Consulta as informações do pedido a ser cancelado.</a:t>
+              <a:t>Guarda as informações de solicitação de cancelamento.</a:t>
             </a:r>
           </a:p>
         </p:txBody>
@@ -5332,7 +5320,7 @@
                 </a:solidFill>
                 <a:latin typeface="Arial" panose="020B0604020202020204" pitchFamily="34" charset="0"/>
               </a:rPr>
-              <a:t> 					             </a:t>
+              <a:t>					             </a:t>
             </a:r>
             <a:r>
               <a:rPr lang="pt-BR" b="1" i="0" u="none" strike="noStrike" baseline="0" dirty="0">
@@ -5366,7 +5354,7 @@
                 </a:solidFill>
                 <a:latin typeface="Calibri" panose="020F0502020204030204" pitchFamily="34" charset="0"/>
               </a:rPr>
-              <a:t>Cancelar a Nota Fiscal do pedido</a:t>
+              <a:t>Cancelar pedido</a:t>
             </a:r>
             <a:endParaRPr lang="pt-BR" sz="2400" b="1" i="0" u="none" strike="noStrike" baseline="0" dirty="0">
               <a:solidFill>
@@ -5389,120 +5377,147 @@
               <a:t>Evento: </a:t>
             </a:r>
             <a:r>
+              <a:rPr lang="pt-BR" sz="2400" i="0" u="none" strike="noStrike" baseline="0" dirty="0">
+                <a:solidFill>
+                  <a:srgbClr val="000000"/>
+                </a:solidFill>
+                <a:latin typeface="Calibri" panose="020F0502020204030204" pitchFamily="34" charset="0"/>
+              </a:rPr>
+              <a:t>Cancelamento do pedido</a:t>
+            </a:r>
+          </a:p>
+          <a:p>
+            <a:pPr marL="0" indent="0">
+              <a:buNone/>
+            </a:pPr>
+            <a:r>
+              <a:rPr lang="pt-BR" sz="2400" b="1" i="0" u="none" strike="noStrike" baseline="0" dirty="0">
+                <a:solidFill>
+                  <a:srgbClr val="000000"/>
+                </a:solidFill>
+                <a:latin typeface="Calibri" panose="020F0502020204030204" pitchFamily="34" charset="0"/>
+              </a:rPr>
+              <a:t>Objetivo: Realizar cancelamento do pedido.</a:t>
+            </a:r>
+          </a:p>
+          <a:p>
+            <a:pPr marL="0" indent="0">
+              <a:buNone/>
+            </a:pPr>
+            <a:r>
+              <a:rPr lang="pt-BR" sz="2400" b="1" i="0" u="none" strike="noStrike" baseline="0" dirty="0">
+                <a:solidFill>
+                  <a:srgbClr val="000000"/>
+                </a:solidFill>
+                <a:latin typeface="Calibri" panose="020F0502020204030204" pitchFamily="34" charset="0"/>
+              </a:rPr>
+              <a:t>Trabalhadores envolvidos: </a:t>
+            </a:r>
+            <a:r>
+              <a:rPr lang="pt-BR" sz="2400" i="0" u="none" strike="noStrike" baseline="0" dirty="0">
+                <a:solidFill>
+                  <a:srgbClr val="000000"/>
+                </a:solidFill>
+                <a:latin typeface="Calibri" panose="020F0502020204030204" pitchFamily="34" charset="0"/>
+              </a:rPr>
+              <a:t>Analista</a:t>
+            </a:r>
+            <a:r>
+              <a:rPr lang="pt-BR" sz="2400" b="1" i="0" u="none" strike="noStrike" baseline="0" dirty="0">
+                <a:solidFill>
+                  <a:srgbClr val="000000"/>
+                </a:solidFill>
+                <a:latin typeface="Calibri" panose="020F0502020204030204" pitchFamily="34" charset="0"/>
+              </a:rPr>
+              <a:t> </a:t>
+            </a:r>
+            <a:r>
+              <a:rPr lang="pt-BR" sz="2400" b="0" i="0" u="none" strike="noStrike" baseline="0" dirty="0">
+                <a:solidFill>
+                  <a:srgbClr val="000000"/>
+                </a:solidFill>
+                <a:latin typeface="Calibri" panose="020F0502020204030204" pitchFamily="34" charset="0"/>
+              </a:rPr>
+              <a:t>Financeiro </a:t>
+            </a:r>
+          </a:p>
+          <a:p>
+            <a:pPr marL="0" indent="0">
+              <a:buNone/>
+            </a:pPr>
+            <a:r>
+              <a:rPr lang="pt-BR" sz="2400" b="0" i="0" u="none" strike="noStrike" baseline="0" dirty="0">
+                <a:solidFill>
+                  <a:srgbClr val="000000"/>
+                </a:solidFill>
+                <a:latin typeface="Calibri" panose="020F0502020204030204" pitchFamily="34" charset="0"/>
+                <a:cs typeface="Calibri" panose="020F0502020204030204" pitchFamily="34" charset="0"/>
+              </a:rPr>
+              <a:t>• Consult</a:t>
+            </a:r>
+            <a:r>
               <a:rPr lang="pt-BR" sz="2400" dirty="0">
                 <a:solidFill>
                   <a:srgbClr val="000000"/>
                 </a:solidFill>
                 <a:latin typeface="Calibri" panose="020F0502020204030204" pitchFamily="34" charset="0"/>
-              </a:rPr>
-              <a:t>Realização do cancelamento da nota fiscal.</a:t>
-            </a:r>
-            <a:endParaRPr lang="pt-BR" sz="2400" i="0" u="none" strike="noStrike" baseline="0" dirty="0">
-              <a:solidFill>
-                <a:srgbClr val="000000"/>
-              </a:solidFill>
-              <a:latin typeface="Calibri" panose="020F0502020204030204" pitchFamily="34" charset="0"/>
-            </a:endParaRPr>
-          </a:p>
-          <a:p>
-            <a:pPr marL="0" indent="0">
-              <a:buNone/>
-            </a:pPr>
-            <a:r>
-              <a:rPr lang="pt-BR" sz="2400" b="1" i="0" u="none" strike="noStrike" baseline="0" dirty="0">
-                <a:solidFill>
-                  <a:srgbClr val="000000"/>
-                </a:solidFill>
-                <a:latin typeface="Calibri" panose="020F0502020204030204" pitchFamily="34" charset="0"/>
-              </a:rPr>
-              <a:t>Objetivo: Realizar cancelamento da nota fiscal.</a:t>
-            </a:r>
-            <a:endParaRPr lang="pt-BR" sz="2400" b="1" dirty="0">
-              <a:solidFill>
-                <a:srgbClr val="000000"/>
-              </a:solidFill>
-              <a:latin typeface="Calibri" panose="020F0502020204030204" pitchFamily="34" charset="0"/>
-            </a:endParaRPr>
-          </a:p>
-          <a:p>
-            <a:pPr marL="0" indent="0">
-              <a:buNone/>
-            </a:pPr>
-            <a:r>
-              <a:rPr lang="pt-BR" sz="2400" b="1" i="0" u="none" strike="noStrike" baseline="0" dirty="0">
-                <a:solidFill>
-                  <a:srgbClr val="000000"/>
-                </a:solidFill>
-                <a:latin typeface="Calibri" panose="020F0502020204030204" pitchFamily="34" charset="0"/>
-              </a:rPr>
-              <a:t>Trabalhadores envolvidos: </a:t>
-            </a:r>
-            <a:r>
-              <a:rPr lang="pt-BR" sz="2400" i="0" u="none" strike="noStrike" baseline="0" dirty="0">
-                <a:solidFill>
-                  <a:srgbClr val="000000"/>
-                </a:solidFill>
-                <a:latin typeface="Calibri" panose="020F0502020204030204" pitchFamily="34" charset="0"/>
-              </a:rPr>
-              <a:t>Analista</a:t>
-            </a:r>
-            <a:r>
-              <a:rPr lang="pt-BR" sz="2400" b="1" i="0" u="none" strike="noStrike" baseline="0" dirty="0">
-                <a:solidFill>
-                  <a:srgbClr val="000000"/>
-                </a:solidFill>
-                <a:latin typeface="Calibri" panose="020F0502020204030204" pitchFamily="34" charset="0"/>
+                <a:cs typeface="Calibri" panose="020F0502020204030204" pitchFamily="34" charset="0"/>
+              </a:rPr>
+              <a:t>a informações da solicitação de cancelamento.</a:t>
+            </a:r>
+          </a:p>
+          <a:p>
+            <a:r>
+              <a:rPr lang="pt-BR" sz="2400" dirty="0">
+                <a:solidFill>
+                  <a:srgbClr val="000000"/>
+                </a:solidFill>
+                <a:latin typeface="Calibri" panose="020F0502020204030204" pitchFamily="34" charset="0"/>
+                <a:cs typeface="Calibri" panose="020F0502020204030204" pitchFamily="34" charset="0"/>
+              </a:rPr>
+              <a:t>Consulta informações de loja e  pedido.</a:t>
+            </a:r>
+          </a:p>
+          <a:p>
+            <a:r>
+              <a:rPr lang="pt-BR" sz="2400" b="0" i="0" u="none" strike="noStrike" baseline="0" dirty="0">
+                <a:solidFill>
+                  <a:srgbClr val="000000"/>
+                </a:solidFill>
+                <a:latin typeface="Calibri" panose="020F0502020204030204" pitchFamily="34" charset="0"/>
+                <a:cs typeface="Calibri" panose="020F0502020204030204" pitchFamily="34" charset="0"/>
+              </a:rPr>
+              <a:t>Recusa solicitação de cancelamento caso haja alguma divergência.</a:t>
+            </a:r>
+          </a:p>
+          <a:p>
+            <a:r>
+              <a:rPr lang="pt-BR" sz="2400" dirty="0">
+                <a:solidFill>
+                  <a:srgbClr val="000000"/>
+                </a:solidFill>
+                <a:latin typeface="Calibri" panose="020F0502020204030204" pitchFamily="34" charset="0"/>
+                <a:cs typeface="Calibri" panose="020F0502020204030204" pitchFamily="34" charset="0"/>
+              </a:rPr>
+              <a:t>Se não houver divergências ele confirma o cancelamento.</a:t>
+            </a:r>
+            <a:r>
+              <a:rPr lang="pt-BR" sz="2400" b="0" i="0" u="none" strike="noStrike" baseline="0" dirty="0">
+                <a:solidFill>
+                  <a:srgbClr val="000000"/>
+                </a:solidFill>
+                <a:latin typeface="Calibri" panose="020F0502020204030204" pitchFamily="34" charset="0"/>
+                <a:cs typeface="Calibri" panose="020F0502020204030204" pitchFamily="34" charset="0"/>
               </a:rPr>
               <a:t> </a:t>
             </a:r>
-            <a:r>
-              <a:rPr lang="pt-BR" sz="2400" b="0" i="0" u="none" strike="noStrike" baseline="0" dirty="0">
-                <a:solidFill>
-                  <a:srgbClr val="000000"/>
-                </a:solidFill>
-                <a:latin typeface="Calibri" panose="020F0502020204030204" pitchFamily="34" charset="0"/>
-              </a:rPr>
-              <a:t>Financeiro </a:t>
-            </a:r>
-          </a:p>
-          <a:p>
-            <a:pPr marL="0" indent="0">
-              <a:buNone/>
-            </a:pPr>
-            <a:r>
-              <a:rPr lang="pt-BR" sz="2400" b="0" i="0" u="none" strike="noStrike" baseline="0" dirty="0">
-                <a:solidFill>
-                  <a:srgbClr val="000000"/>
-                </a:solidFill>
-                <a:latin typeface="Calibri" panose="020F0502020204030204" pitchFamily="34" charset="0"/>
-                <a:cs typeface="Calibri" panose="020F0502020204030204" pitchFamily="34" charset="0"/>
-              </a:rPr>
-              <a:t>•Consult</a:t>
-            </a:r>
-            <a:r>
-              <a:rPr lang="pt-BR" sz="2400" dirty="0">
-                <a:solidFill>
-                  <a:srgbClr val="000000"/>
-                </a:solidFill>
-                <a:latin typeface="Calibri" panose="020F0502020204030204" pitchFamily="34" charset="0"/>
-                <a:cs typeface="Calibri" panose="020F0502020204030204" pitchFamily="34" charset="0"/>
-              </a:rPr>
-              <a:t>a informações do pedido para cancelar nota fiscal.</a:t>
-            </a:r>
-            <a:endParaRPr lang="pt-BR" sz="2400" b="0" i="0" u="none" strike="noStrike" baseline="0" dirty="0">
-              <a:solidFill>
-                <a:srgbClr val="000000"/>
-              </a:solidFill>
-              <a:latin typeface="Calibri" panose="020F0502020204030204" pitchFamily="34" charset="0"/>
-              <a:cs typeface="Calibri" panose="020F0502020204030204" pitchFamily="34" charset="0"/>
-            </a:endParaRPr>
           </a:p>
         </p:txBody>
       </p:sp>
     </p:spTree>
     <p:extLst>
       <p:ext uri="{BB962C8B-B14F-4D97-AF65-F5344CB8AC3E}">
-        <p14:creationId xmlns:p14="http://schemas.microsoft.com/office/powerpoint/2010/main" val="2540888946"/>
+        <p14:creationId xmlns:p14="http://schemas.microsoft.com/office/powerpoint/2010/main" val="1884437551"/>
       </p:ext>
     </p:extLst>
   </p:cSld>
@@ -5576,7 +5591,7 @@
                 </a:solidFill>
                 <a:latin typeface="Arial" panose="020B0604020202020204" pitchFamily="34" charset="0"/>
               </a:rPr>
-              <a:t>					             </a:t>
+              <a:t> 					             </a:t>
             </a:r>
             <a:r>
               <a:rPr lang="pt-BR" b="1" i="0" u="none" strike="noStrike" baseline="0" dirty="0">
@@ -5610,7 +5625,7 @@
                 </a:solidFill>
                 <a:latin typeface="Calibri" panose="020F0502020204030204" pitchFamily="34" charset="0"/>
               </a:rPr>
-              <a:t>Cancelar pedido</a:t>
+              <a:t>Cancelar a Nota Fiscal do pedido</a:t>
             </a:r>
             <a:endParaRPr lang="pt-BR" sz="2400" b="1" i="0" u="none" strike="noStrike" baseline="0" dirty="0">
               <a:solidFill>
@@ -5633,19 +5648,63 @@
               <a:t>Evento: </a:t>
             </a:r>
             <a:r>
+              <a:rPr lang="pt-BR" sz="2400" dirty="0">
+                <a:solidFill>
+                  <a:srgbClr val="000000"/>
+                </a:solidFill>
+                <a:latin typeface="Calibri" panose="020F0502020204030204" pitchFamily="34" charset="0"/>
+              </a:rPr>
+              <a:t>Realização do cancelamento da nota fiscal.</a:t>
+            </a:r>
+            <a:endParaRPr lang="pt-BR" sz="2400" i="0" u="none" strike="noStrike" baseline="0" dirty="0">
+              <a:solidFill>
+                <a:srgbClr val="000000"/>
+              </a:solidFill>
+              <a:latin typeface="Calibri" panose="020F0502020204030204" pitchFamily="34" charset="0"/>
+            </a:endParaRPr>
+          </a:p>
+          <a:p>
+            <a:pPr marL="0" indent="0">
+              <a:buNone/>
+            </a:pPr>
+            <a:r>
+              <a:rPr lang="pt-BR" sz="2400" b="1" i="0" u="none" strike="noStrike" baseline="0" dirty="0">
+                <a:solidFill>
+                  <a:srgbClr val="000000"/>
+                </a:solidFill>
+                <a:latin typeface="Calibri" panose="020F0502020204030204" pitchFamily="34" charset="0"/>
+              </a:rPr>
+              <a:t>Objetivo: Realizar cancelamento da nota fiscal.</a:t>
+            </a:r>
+            <a:endParaRPr lang="pt-BR" sz="2400" b="1" dirty="0">
+              <a:solidFill>
+                <a:srgbClr val="000000"/>
+              </a:solidFill>
+              <a:latin typeface="Calibri" panose="020F0502020204030204" pitchFamily="34" charset="0"/>
+            </a:endParaRPr>
+          </a:p>
+          <a:p>
+            <a:pPr marL="0" indent="0">
+              <a:buNone/>
+            </a:pPr>
+            <a:r>
+              <a:rPr lang="pt-BR" sz="2400" b="1" i="0" u="none" strike="noStrike" baseline="0" dirty="0">
+                <a:solidFill>
+                  <a:srgbClr val="000000"/>
+                </a:solidFill>
+                <a:latin typeface="Calibri" panose="020F0502020204030204" pitchFamily="34" charset="0"/>
+              </a:rPr>
+              <a:t>Trabalhadores envolvidos: </a:t>
+            </a:r>
+            <a:r>
               <a:rPr lang="pt-BR" sz="2400" i="0" u="none" strike="noStrike" baseline="0" dirty="0">
                 <a:solidFill>
                   <a:srgbClr val="000000"/>
                 </a:solidFill>
                 <a:latin typeface="Calibri" panose="020F0502020204030204" pitchFamily="34" charset="0"/>
               </a:rPr>
-              <a:t>Cancelamento do pedido</a:t>
-            </a:r>
-          </a:p>
-          <a:p>
-            <a:pPr marL="0" indent="0">
-              <a:buNone/>
-            </a:pPr>
+              <a:t>Analista</a:t>
+            </a:r>
             <a:r>
               <a:rPr lang="pt-BR" sz="2400" b="1" i="0" u="none" strike="noStrike" baseline="0" dirty="0">
                 <a:solidFill>
@@ -5653,38 +5712,6 @@
                 </a:solidFill>
                 <a:latin typeface="Calibri" panose="020F0502020204030204" pitchFamily="34" charset="0"/>
               </a:rPr>
-              <a:t>Objetivo: Realizar cancelamento do pedido.</a:t>
-            </a:r>
-          </a:p>
-          <a:p>
-            <a:pPr marL="0" indent="0">
-              <a:buNone/>
-            </a:pPr>
-            <a:r>
-              <a:rPr lang="pt-BR" sz="2400" b="1" i="0" u="none" strike="noStrike" baseline="0" dirty="0">
-                <a:solidFill>
-                  <a:srgbClr val="000000"/>
-                </a:solidFill>
-                <a:latin typeface="Calibri" panose="020F0502020204030204" pitchFamily="34" charset="0"/>
-              </a:rPr>
-              <a:t>Trabalhadores envolvidos: </a:t>
-            </a:r>
-            <a:r>
-              <a:rPr lang="pt-BR" sz="2400" i="0" u="none" strike="noStrike" baseline="0" dirty="0">
-                <a:solidFill>
-                  <a:srgbClr val="000000"/>
-                </a:solidFill>
-                <a:latin typeface="Calibri" panose="020F0502020204030204" pitchFamily="34" charset="0"/>
-              </a:rPr>
-              <a:t>Analista</a:t>
-            </a:r>
-            <a:r>
-              <a:rPr lang="pt-BR" sz="2400" b="1" i="0" u="none" strike="noStrike" baseline="0" dirty="0">
-                <a:solidFill>
-                  <a:srgbClr val="000000"/>
-                </a:solidFill>
-                <a:latin typeface="Calibri" panose="020F0502020204030204" pitchFamily="34" charset="0"/>
-              </a:rPr>
               <a:t> </a:t>
             </a:r>
             <a:r>
@@ -5698,9 +5725,6 @@
             </a:r>
           </a:p>
           <a:p>
-            <a:pPr marL="0" indent="0">
-              <a:buNone/>
-            </a:pPr>
             <a:r>
               <a:rPr lang="pt-BR" sz="2400" b="0" i="0" u="none" strike="noStrike" baseline="0" dirty="0">
                 <a:solidFill>
@@ -5719,7 +5743,7 @@
                 <a:latin typeface="Calibri" panose="020F0502020204030204" pitchFamily="34" charset="0"/>
                 <a:cs typeface="Calibri" panose="020F0502020204030204" pitchFamily="34" charset="0"/>
               </a:rPr>
-              <a:t>a informações da loja para cancelar pedido.</a:t>
+              <a:t>a informações da solicitação de cancelamento.</a:t>
             </a:r>
           </a:p>
           <a:p>
@@ -5731,41 +5755,31 @@
                 <a:latin typeface="Calibri" panose="020F0502020204030204" pitchFamily="34" charset="0"/>
                 <a:cs typeface="Calibri" panose="020F0502020204030204" pitchFamily="34" charset="0"/>
               </a:rPr>
-              <a:t>Consulta informações de pedido para cancelamento.</a:t>
-            </a:r>
-          </a:p>
-          <a:p>
-            <a:r>
-              <a:rPr lang="pt-BR" sz="2400" b="0" i="0" u="none" strike="noStrike" baseline="0" dirty="0">
+              <a:t>Altera status da solicitação de cancelamento.</a:t>
+            </a:r>
+          </a:p>
+          <a:p>
+            <a:r>
+              <a:rPr lang="pt-BR" sz="2400" dirty="0">
                 <a:solidFill>
                   <a:srgbClr val="000000"/>
                 </a:solidFill>
                 <a:latin typeface="Calibri" panose="020F0502020204030204" pitchFamily="34" charset="0"/>
                 <a:cs typeface="Calibri" panose="020F0502020204030204" pitchFamily="34" charset="0"/>
               </a:rPr>
-              <a:t>Consulta as informações do fina</a:t>
-            </a:r>
-            <a:r>
-              <a:rPr lang="pt-BR" sz="2400" dirty="0">
+              <a:t>Solicita ao responsável pelo departamento o cancelamento </a:t>
+            </a:r>
+            <a:r>
+              <a:rPr lang="pt-BR" sz="2400">
                 <a:solidFill>
                   <a:srgbClr val="000000"/>
                 </a:solidFill>
                 <a:latin typeface="Calibri" panose="020F0502020204030204" pitchFamily="34" charset="0"/>
                 <a:cs typeface="Calibri" panose="020F0502020204030204" pitchFamily="34" charset="0"/>
               </a:rPr>
-              <a:t>nceiro para </a:t>
-            </a:r>
-            <a:r>
-              <a:rPr lang="pt-BR" sz="2400">
-                <a:solidFill>
-                  <a:srgbClr val="000000"/>
-                </a:solidFill>
-                <a:latin typeface="Calibri" panose="020F0502020204030204" pitchFamily="34" charset="0"/>
-                <a:cs typeface="Calibri" panose="020F0502020204030204" pitchFamily="34" charset="0"/>
-              </a:rPr>
-              <a:t>cancelar pedido.</a:t>
-            </a:r>
-            <a:endParaRPr lang="pt-BR" sz="2400" b="0" i="0" u="none" strike="noStrike" baseline="0" dirty="0">
+              <a:t>da nota.</a:t>
+            </a:r>
+            <a:endParaRPr lang="pt-BR" sz="2400" dirty="0">
               <a:solidFill>
                 <a:srgbClr val="000000"/>
               </a:solidFill>
@@ -5778,7 +5792,7 @@
     </p:spTree>
     <p:extLst>
       <p:ext uri="{BB962C8B-B14F-4D97-AF65-F5344CB8AC3E}">
-        <p14:creationId xmlns:p14="http://schemas.microsoft.com/office/powerpoint/2010/main" val="1884437551"/>
+        <p14:creationId xmlns:p14="http://schemas.microsoft.com/office/powerpoint/2010/main" val="2540888946"/>
       </p:ext>
     </p:extLst>
   </p:cSld>

</xml_diff>